<commit_message>
Updated with few more content
</commit_message>
<xml_diff>
--- a/Rest on aws (using java).pptx
+++ b/Rest on aws (using java).pptx
@@ -110,6 +110,11 @@
       </a:defRPr>
     </a:lvl9pPr>
   </p:defaultTextStyle>
+  <p:extLst>
+    <p:ext uri="{EFAFB233-063F-42B5-8137-9DF3F51BA10A}">
+      <p15:sldGuideLst xmlns:p15="http://schemas.microsoft.com/office/powerpoint/2012/main"/>
+    </p:ext>
+  </p:extLst>
 </p:presentation>
 </file>
 
@@ -246,7 +251,7 @@
           <a:p>
             <a:fld id="{48A87A34-81AB-432B-8DAE-1953F412C126}" type="datetimeFigureOut">
               <a:rPr lang="en-US" dirty="0"/>
-              <a:t>2/26/2017</a:t>
+              <a:t>3/1/2017</a:t>
             </a:fld>
             <a:endParaRPr lang="en-US" dirty="0"/>
           </a:p>
@@ -528,7 +533,7 @@
           <a:p>
             <a:fld id="{48A87A34-81AB-432B-8DAE-1953F412C126}" type="datetimeFigureOut">
               <a:rPr lang="en-US" dirty="0"/>
-              <a:t>2/26/2017</a:t>
+              <a:t>3/1/2017</a:t>
             </a:fld>
             <a:endParaRPr lang="en-US" dirty="0"/>
           </a:p>
@@ -715,7 +720,7 @@
           <a:p>
             <a:fld id="{48A87A34-81AB-432B-8DAE-1953F412C126}" type="datetimeFigureOut">
               <a:rPr lang="en-US" dirty="0"/>
-              <a:t>2/26/2017</a:t>
+              <a:t>3/1/2017</a:t>
             </a:fld>
             <a:endParaRPr lang="en-US" dirty="0"/>
           </a:p>
@@ -971,7 +976,7 @@
           <a:p>
             <a:fld id="{48A87A34-81AB-432B-8DAE-1953F412C126}" type="datetimeFigureOut">
               <a:rPr lang="en-US" dirty="0"/>
-              <a:t>2/26/2017</a:t>
+              <a:t>3/1/2017</a:t>
             </a:fld>
             <a:endParaRPr lang="en-US" dirty="0"/>
           </a:p>
@@ -1390,7 +1395,7 @@
           <a:p>
             <a:fld id="{48A87A34-81AB-432B-8DAE-1953F412C126}" type="datetimeFigureOut">
               <a:rPr lang="en-US" dirty="0"/>
-              <a:t>2/26/2017</a:t>
+              <a:t>3/1/2017</a:t>
             </a:fld>
             <a:endParaRPr lang="en-US" dirty="0"/>
           </a:p>
@@ -1931,7 +1936,7 @@
           <a:p>
             <a:fld id="{48A87A34-81AB-432B-8DAE-1953F412C126}" type="datetimeFigureOut">
               <a:rPr lang="en-US" dirty="0"/>
-              <a:t>2/26/2017</a:t>
+              <a:t>3/1/2017</a:t>
             </a:fld>
             <a:endParaRPr lang="en-US" dirty="0"/>
           </a:p>
@@ -2766,7 +2771,7 @@
           <a:p>
             <a:fld id="{48A87A34-81AB-432B-8DAE-1953F412C126}" type="datetimeFigureOut">
               <a:rPr lang="en-US" dirty="0"/>
-              <a:t>2/26/2017</a:t>
+              <a:t>3/1/2017</a:t>
             </a:fld>
             <a:endParaRPr lang="en-US" dirty="0"/>
           </a:p>
@@ -2931,7 +2936,7 @@
           <a:p>
             <a:fld id="{48A87A34-81AB-432B-8DAE-1953F412C126}" type="datetimeFigureOut">
               <a:rPr lang="en-US" dirty="0"/>
-              <a:t>2/26/2017</a:t>
+              <a:t>3/1/2017</a:t>
             </a:fld>
             <a:endParaRPr lang="en-US" dirty="0"/>
           </a:p>
@@ -3110,7 +3115,7 @@
           <a:p>
             <a:fld id="{48A87A34-81AB-432B-8DAE-1953F412C126}" type="datetimeFigureOut">
               <a:rPr lang="en-US" dirty="0"/>
-              <a:t>2/26/2017</a:t>
+              <a:t>3/1/2017</a:t>
             </a:fld>
             <a:endParaRPr lang="en-US" dirty="0"/>
           </a:p>
@@ -3275,7 +3280,7 @@
           <a:p>
             <a:fld id="{48A87A34-81AB-432B-8DAE-1953F412C126}" type="datetimeFigureOut">
               <a:rPr lang="en-US" dirty="0"/>
-              <a:t>2/26/2017</a:t>
+              <a:t>3/1/2017</a:t>
             </a:fld>
             <a:endParaRPr lang="en-US" dirty="0"/>
           </a:p>
@@ -3518,7 +3523,7 @@
           <a:p>
             <a:fld id="{48A87A34-81AB-432B-8DAE-1953F412C126}" type="datetimeFigureOut">
               <a:rPr lang="en-US" dirty="0"/>
-              <a:t>2/26/2017</a:t>
+              <a:t>3/1/2017</a:t>
             </a:fld>
             <a:endParaRPr lang="en-US" dirty="0"/>
           </a:p>
@@ -3750,7 +3755,7 @@
           <a:p>
             <a:fld id="{48A87A34-81AB-432B-8DAE-1953F412C126}" type="datetimeFigureOut">
               <a:rPr lang="en-US" dirty="0"/>
-              <a:t>2/26/2017</a:t>
+              <a:t>3/1/2017</a:t>
             </a:fld>
             <a:endParaRPr lang="en-US" dirty="0"/>
           </a:p>
@@ -4118,7 +4123,7 @@
           <a:p>
             <a:fld id="{48A87A34-81AB-432B-8DAE-1953F412C126}" type="datetimeFigureOut">
               <a:rPr lang="en-US" dirty="0"/>
-              <a:t>2/26/2017</a:t>
+              <a:t>3/1/2017</a:t>
             </a:fld>
             <a:endParaRPr lang="en-US" dirty="0"/>
           </a:p>
@@ -4231,7 +4236,7 @@
           <a:p>
             <a:fld id="{48A87A34-81AB-432B-8DAE-1953F412C126}" type="datetimeFigureOut">
               <a:rPr lang="en-US" dirty="0"/>
-              <a:t>2/26/2017</a:t>
+              <a:t>3/1/2017</a:t>
             </a:fld>
             <a:endParaRPr lang="en-US" dirty="0"/>
           </a:p>
@@ -4321,7 +4326,7 @@
           <a:p>
             <a:fld id="{48A87A34-81AB-432B-8DAE-1953F412C126}" type="datetimeFigureOut">
               <a:rPr lang="en-US" dirty="0"/>
-              <a:t>2/26/2017</a:t>
+              <a:t>3/1/2017</a:t>
             </a:fld>
             <a:endParaRPr lang="en-US" dirty="0"/>
           </a:p>
@@ -4567,7 +4572,7 @@
           <a:p>
             <a:fld id="{48A87A34-81AB-432B-8DAE-1953F412C126}" type="datetimeFigureOut">
               <a:rPr lang="en-US" dirty="0"/>
-              <a:t>2/26/2017</a:t>
+              <a:t>3/1/2017</a:t>
             </a:fld>
             <a:endParaRPr lang="en-US" dirty="0"/>
           </a:p>
@@ -4849,7 +4854,7 @@
           <a:p>
             <a:fld id="{48A87A34-81AB-432B-8DAE-1953F412C126}" type="datetimeFigureOut">
               <a:rPr lang="en-US" dirty="0"/>
-              <a:t>2/26/2017</a:t>
+              <a:t>3/1/2017</a:t>
             </a:fld>
             <a:endParaRPr lang="en-US" dirty="0"/>
           </a:p>
@@ -5058,7 +5063,7 @@
             <a:fld id="{48A87A34-81AB-432B-8DAE-1953F412C126}" type="datetimeFigureOut">
               <a:rPr lang="en-US" dirty="0"/>
               <a:pPr/>
-              <a:t>2/26/2017</a:t>
+              <a:t>3/1/2017</a:t>
             </a:fld>
             <a:endParaRPr lang="en-US" dirty="0"/>
           </a:p>
@@ -5589,7 +5594,7 @@
         <p:spPr/>
         <p:txBody>
           <a:bodyPr>
-            <a:normAutofit lnSpcReduction="10000"/>
+            <a:normAutofit fontScale="92500"/>
           </a:bodyPr>
           <a:lstStyle/>
           <a:p>
@@ -5706,7 +5711,6 @@
               <a:rPr lang="en-US" dirty="0"/>
               <a:t>Small Introduction to Microservices</a:t>
             </a:r>
-            <a:endParaRPr lang="en-US" dirty="0"/>
           </a:p>
           <a:p>
             <a:pPr marL="914400" lvl="1" indent="-457200">
@@ -5737,7 +5741,6 @@
               <a:rPr lang="en-US" dirty="0"/>
               <a:t>Continuous Learning</a:t>
             </a:r>
-            <a:endParaRPr lang="en-US" dirty="0"/>
           </a:p>
         </p:txBody>
       </p:sp>
@@ -5751,6 +5754,13 @@
   <p:clrMapOvr>
     <a:masterClrMapping/>
   </p:clrMapOvr>
+  <p:timing>
+    <p:tnLst>
+      <p:par>
+        <p:cTn id="1" dur="indefinite" restart="never" nodeType="tmRoot"/>
+      </p:par>
+    </p:tnLst>
+  </p:timing>
 </p:sld>
 </file>
 
@@ -5814,14 +5824,175 @@
         </p:blipFill>
         <p:spPr>
           <a:xfrm>
-            <a:off x="2352675" y="1227551"/>
-            <a:ext cx="7410450" cy="4390438"/>
+            <a:off x="342720" y="1229803"/>
+            <a:ext cx="5609506" cy="2882454"/>
           </a:xfrm>
           <a:prstGeom prst="rect">
             <a:avLst/>
           </a:prstGeom>
         </p:spPr>
       </p:pic>
+      <p:sp>
+        <p:nvSpPr>
+          <p:cNvPr id="4" name="Content Placeholder 2"/>
+          <p:cNvSpPr>
+            <a:spLocks noGrp="1"/>
+          </p:cNvSpPr>
+          <p:nvPr>
+            <p:ph idx="1"/>
+          </p:nvPr>
+        </p:nvSpPr>
+        <p:spPr>
+          <a:xfrm>
+            <a:off x="6090248" y="1229803"/>
+            <a:ext cx="5867421" cy="5326272"/>
+          </a:xfrm>
+        </p:spPr>
+        <p:txBody>
+          <a:bodyPr>
+            <a:normAutofit fontScale="85000" lnSpcReduction="10000"/>
+          </a:bodyPr>
+          <a:lstStyle/>
+          <a:p>
+            <a:r>
+              <a:rPr lang="en-US" b="1" dirty="0" smtClean="0"/>
+              <a:t>Resource</a:t>
+            </a:r>
+          </a:p>
+          <a:p>
+            <a:r>
+              <a:rPr lang="en-US" b="1" dirty="0" smtClean="0"/>
+              <a:t>Http verb</a:t>
+            </a:r>
+          </a:p>
+          <a:p>
+            <a:pPr lvl="1"/>
+            <a:r>
+              <a:rPr lang="en-US" dirty="0" smtClean="0"/>
+              <a:t>HEAD </a:t>
+            </a:r>
+            <a:r>
+              <a:rPr lang="en-US" dirty="0"/>
+              <a:t>– Idempotent, Safe</a:t>
+            </a:r>
+          </a:p>
+          <a:p>
+            <a:pPr lvl="1"/>
+            <a:r>
+              <a:rPr lang="en-US" dirty="0" smtClean="0"/>
+              <a:t>OPTIONS </a:t>
+            </a:r>
+            <a:r>
+              <a:rPr lang="en-US" dirty="0"/>
+              <a:t>– Idempotent, Safe</a:t>
+            </a:r>
+          </a:p>
+          <a:p>
+            <a:pPr lvl="1"/>
+            <a:r>
+              <a:rPr lang="en-US" dirty="0"/>
+              <a:t>GET – Idempotent, Safe</a:t>
+            </a:r>
+          </a:p>
+          <a:p>
+            <a:pPr lvl="1"/>
+            <a:r>
+              <a:rPr lang="en-US" dirty="0"/>
+              <a:t>DELETE - Idempotent </a:t>
+            </a:r>
+            <a:endParaRPr lang="en-US" dirty="0" smtClean="0"/>
+          </a:p>
+          <a:p>
+            <a:pPr lvl="1"/>
+            <a:r>
+              <a:rPr lang="en-US" dirty="0" smtClean="0"/>
+              <a:t>PUT </a:t>
+            </a:r>
+            <a:r>
+              <a:rPr lang="en-US" dirty="0"/>
+              <a:t>- Idempotent</a:t>
+            </a:r>
+          </a:p>
+          <a:p>
+            <a:pPr lvl="1"/>
+            <a:r>
+              <a:rPr lang="en-US" dirty="0" smtClean="0"/>
+              <a:t>POST</a:t>
+            </a:r>
+            <a:endParaRPr lang="en-US" dirty="0"/>
+          </a:p>
+          <a:p>
+            <a:pPr lvl="1"/>
+            <a:r>
+              <a:rPr lang="en-US" dirty="0" smtClean="0"/>
+              <a:t>PATCH</a:t>
+            </a:r>
+          </a:p>
+          <a:p>
+            <a:r>
+              <a:rPr lang="en-US" b="1" dirty="0" smtClean="0"/>
+              <a:t>Response codes</a:t>
+            </a:r>
+          </a:p>
+          <a:p>
+            <a:pPr lvl="1"/>
+            <a:r>
+              <a:rPr lang="en-US" b="1" dirty="0" smtClean="0"/>
+              <a:t>200x</a:t>
+            </a:r>
+          </a:p>
+          <a:p>
+            <a:pPr lvl="1"/>
+            <a:r>
+              <a:rPr lang="en-US" b="1" dirty="0" smtClean="0"/>
+              <a:t>300x</a:t>
+            </a:r>
+          </a:p>
+          <a:p>
+            <a:pPr lvl="1"/>
+            <a:r>
+              <a:rPr lang="en-US" b="1" dirty="0" smtClean="0"/>
+              <a:t>400x</a:t>
+            </a:r>
+          </a:p>
+          <a:p>
+            <a:pPr lvl="1"/>
+            <a:r>
+              <a:rPr lang="en-US" b="1" dirty="0" smtClean="0"/>
+              <a:t>500x</a:t>
+            </a:r>
+          </a:p>
+          <a:p>
+            <a:r>
+              <a:rPr lang="en-US" b="1" dirty="0" smtClean="0"/>
+              <a:t>HATEOAS </a:t>
+            </a:r>
+            <a:r>
+              <a:rPr lang="en-US" sz="1600" b="1" dirty="0" smtClean="0"/>
+              <a:t>(</a:t>
+            </a:r>
+            <a:r>
+              <a:rPr lang="en-US" sz="1600" dirty="0">
+                <a:effectLst/>
+              </a:rPr>
+              <a:t>Hypermedia as the Engine of Application </a:t>
+            </a:r>
+            <a:r>
+              <a:rPr lang="en-US" sz="1600" dirty="0" smtClean="0">
+                <a:effectLst/>
+              </a:rPr>
+              <a:t>State)</a:t>
+            </a:r>
+            <a:endParaRPr lang="en-US" dirty="0" smtClean="0"/>
+          </a:p>
+          <a:p>
+            <a:pPr marL="0" indent="0">
+              <a:buNone/>
+            </a:pPr>
+            <a:endParaRPr lang="en-US" b="1" dirty="0" smtClean="0"/>
+          </a:p>
+        </p:txBody>
+      </p:sp>
     </p:spTree>
     <p:extLst>
       <p:ext uri="{BB962C8B-B14F-4D97-AF65-F5344CB8AC3E}">
@@ -5832,6 +6003,13 @@
   <p:clrMapOvr>
     <a:masterClrMapping/>
   </p:clrMapOvr>
+  <p:timing>
+    <p:tnLst>
+      <p:par>
+        <p:cTn id="1" dur="indefinite" restart="never" nodeType="tmRoot"/>
+      </p:par>
+    </p:tnLst>
+  </p:timing>
 </p:sld>
 </file>
 
@@ -5895,14 +6073,186 @@
         </p:blipFill>
         <p:spPr>
           <a:xfrm>
-            <a:off x="380202" y="1057274"/>
-            <a:ext cx="11431595" cy="5586861"/>
+            <a:off x="317331" y="1318317"/>
+            <a:ext cx="5332971" cy="4012807"/>
           </a:xfrm>
           <a:prstGeom prst="rect">
             <a:avLst/>
           </a:prstGeom>
         </p:spPr>
       </p:pic>
+      <p:sp>
+        <p:nvSpPr>
+          <p:cNvPr id="5" name="Content Placeholder 2"/>
+          <p:cNvSpPr>
+            <a:spLocks noGrp="1"/>
+          </p:cNvSpPr>
+          <p:nvPr>
+            <p:ph idx="1"/>
+          </p:nvPr>
+        </p:nvSpPr>
+        <p:spPr>
+          <a:xfrm>
+            <a:off x="5650302" y="1229803"/>
+            <a:ext cx="6307368" cy="5326272"/>
+          </a:xfrm>
+        </p:spPr>
+        <p:txBody>
+          <a:bodyPr>
+            <a:normAutofit fontScale="62500" lnSpcReduction="20000"/>
+          </a:bodyPr>
+          <a:lstStyle/>
+          <a:p>
+            <a:r>
+              <a:rPr lang="en-US" b="1" dirty="0" smtClean="0"/>
+              <a:t>They are not</a:t>
+            </a:r>
+          </a:p>
+          <a:p>
+            <a:pPr lvl="1"/>
+            <a:r>
+              <a:rPr lang="en-US" dirty="0" smtClean="0"/>
+              <a:t>Monolithic / Layered / Intelligently or centrally integrated architectures</a:t>
+            </a:r>
+          </a:p>
+          <a:p>
+            <a:r>
+              <a:rPr lang="en-US" b="1" dirty="0" smtClean="0"/>
+              <a:t>Benefits</a:t>
+            </a:r>
+          </a:p>
+          <a:p>
+            <a:pPr lvl="1"/>
+            <a:r>
+              <a:rPr lang="en-US" dirty="0" smtClean="0"/>
+              <a:t>Autonomy &amp; Responsibilities, Scalability, Innovation &amp; Speed, Technology diversity, Lower developer cognitive load</a:t>
+            </a:r>
+          </a:p>
+          <a:p>
+            <a:r>
+              <a:rPr lang="en-US" b="1" dirty="0" smtClean="0"/>
+              <a:t>Complexities</a:t>
+            </a:r>
+          </a:p>
+          <a:p>
+            <a:pPr lvl="1"/>
+            <a:r>
+              <a:rPr lang="en-US" dirty="0" smtClean="0"/>
+              <a:t>Communication, Execution (Investment), Resilience, Maintenance, Operational</a:t>
+            </a:r>
+          </a:p>
+          <a:p>
+            <a:endParaRPr lang="en-US" b="1" dirty="0" smtClean="0"/>
+          </a:p>
+          <a:p>
+            <a:pPr marL="0" indent="0">
+              <a:buNone/>
+            </a:pPr>
+            <a:r>
+              <a:rPr lang="en-US" u="sng" dirty="0" smtClean="0"/>
+              <a:t>Useful tools</a:t>
+            </a:r>
+          </a:p>
+          <a:p>
+            <a:r>
+              <a:rPr lang="en-US" b="1" dirty="0" smtClean="0"/>
+              <a:t>Monitoring</a:t>
+            </a:r>
+          </a:p>
+          <a:p>
+            <a:pPr lvl="1"/>
+            <a:r>
+              <a:rPr lang="en-US" dirty="0" smtClean="0"/>
+              <a:t>Graphite, Riemann, </a:t>
+            </a:r>
+            <a:r>
+              <a:rPr lang="en-US" dirty="0" err="1" smtClean="0"/>
+              <a:t>WatchDog</a:t>
+            </a:r>
+            <a:r>
+              <a:rPr lang="en-US" dirty="0" smtClean="0"/>
+              <a:t>/</a:t>
+            </a:r>
+            <a:r>
+              <a:rPr lang="en-US" dirty="0" err="1" smtClean="0"/>
+              <a:t>CloudDog</a:t>
+            </a:r>
+            <a:endParaRPr lang="en-US" dirty="0" smtClean="0"/>
+          </a:p>
+          <a:p>
+            <a:r>
+              <a:rPr lang="en-US" b="1" dirty="0" smtClean="0"/>
+              <a:t>Logging</a:t>
+            </a:r>
+          </a:p>
+          <a:p>
+            <a:pPr lvl="1"/>
+            <a:r>
+              <a:rPr lang="en-US" dirty="0" err="1"/>
+              <a:t>Logstash</a:t>
+            </a:r>
+            <a:r>
+              <a:rPr lang="en-US" dirty="0"/>
+              <a:t>, </a:t>
+            </a:r>
+            <a:r>
+              <a:rPr lang="en-US" dirty="0" err="1"/>
+              <a:t>Kibana</a:t>
+            </a:r>
+            <a:r>
+              <a:rPr lang="en-US" dirty="0"/>
+              <a:t> or </a:t>
+            </a:r>
+            <a:r>
+              <a:rPr lang="en-US" dirty="0" err="1"/>
+              <a:t>Splunk</a:t>
+            </a:r>
+            <a:endParaRPr lang="en-US" dirty="0" smtClean="0"/>
+          </a:p>
+          <a:p>
+            <a:r>
+              <a:rPr lang="en-US" b="1" dirty="0" smtClean="0"/>
+              <a:t>Deployment</a:t>
+            </a:r>
+          </a:p>
+          <a:p>
+            <a:pPr lvl="1"/>
+            <a:r>
+              <a:rPr lang="en-US" b="1" dirty="0"/>
+              <a:t> </a:t>
+            </a:r>
+            <a:r>
+              <a:rPr lang="en-US" b="1" dirty="0" smtClean="0"/>
+              <a:t>Green field development (Green/Blue server)</a:t>
+            </a:r>
+          </a:p>
+          <a:p>
+            <a:r>
+              <a:rPr lang="en-US" b="1" dirty="0" smtClean="0"/>
+              <a:t>Resilience</a:t>
+            </a:r>
+          </a:p>
+          <a:p>
+            <a:pPr lvl="1"/>
+            <a:r>
+              <a:rPr lang="en-US" dirty="0" err="1" smtClean="0"/>
+              <a:t>Hysterix</a:t>
+            </a:r>
+            <a:r>
+              <a:rPr lang="en-US" dirty="0" smtClean="0"/>
+              <a:t>, </a:t>
+            </a:r>
+            <a:r>
+              <a:rPr lang="en-US" dirty="0" err="1" smtClean="0"/>
+              <a:t>ChaosMonkey</a:t>
+            </a:r>
+            <a:endParaRPr lang="en-US" dirty="0" smtClean="0"/>
+          </a:p>
+          <a:p>
+            <a:endParaRPr lang="en-US" dirty="0"/>
+          </a:p>
+        </p:txBody>
+      </p:sp>
     </p:spTree>
     <p:extLst>
       <p:ext uri="{BB962C8B-B14F-4D97-AF65-F5344CB8AC3E}">
@@ -5913,6 +6263,13 @@
   <p:clrMapOvr>
     <a:masterClrMapping/>
   </p:clrMapOvr>
+  <p:timing>
+    <p:tnLst>
+      <p:par>
+        <p:cTn id="1" dur="indefinite" restart="never" nodeType="tmRoot"/>
+      </p:par>
+    </p:tnLst>
+  </p:timing>
 </p:sld>
 </file>
 
@@ -5995,6 +6352,13 @@
   <p:clrMapOvr>
     <a:masterClrMapping/>
   </p:clrMapOvr>
+  <p:timing>
+    <p:tnLst>
+      <p:par>
+        <p:cTn id="1" dur="indefinite" restart="never" nodeType="tmRoot"/>
+      </p:par>
+    </p:tnLst>
+  </p:timing>
 </p:sld>
 </file>
 
@@ -6096,7 +6460,6 @@
               <a:rPr lang="en-US" dirty="0"/>
               <a:t>Time for next course (Suggestions needed)</a:t>
             </a:r>
-            <a:endParaRPr lang="en-US" dirty="0"/>
           </a:p>
         </p:txBody>
       </p:sp>
@@ -6110,6 +6473,13 @@
   <p:clrMapOvr>
     <a:masterClrMapping/>
   </p:clrMapOvr>
+  <p:timing>
+    <p:tnLst>
+      <p:par>
+        <p:cTn id="1" dur="indefinite" restart="never" nodeType="tmRoot"/>
+      </p:par>
+    </p:tnLst>
+  </p:timing>
 </p:sld>
 </file>
 
@@ -6181,6 +6551,13 @@
   <p:clrMapOvr>
     <a:masterClrMapping/>
   </p:clrMapOvr>
+  <p:timing>
+    <p:tnLst>
+      <p:par>
+        <p:cTn id="1" dur="indefinite" restart="never" nodeType="tmRoot"/>
+      </p:par>
+    </p:tnLst>
+  </p:timing>
 </p:sld>
 </file>
 

</xml_diff>